<commit_message>
Update with grey scale screenshot
</commit_message>
<xml_diff>
--- a/LondonCrimeData - #2.pptx
+++ b/LondonCrimeData - #2.pptx
@@ -250,7 +250,7 @@
           <a:p>
             <a:fld id="{3FB6FB5E-3506-4600-8D76-9780A4BAAB5B}" type="datetimeFigureOut">
               <a:rPr lang="de-DE" smtClean="0"/>
-              <a:t>30.05.2016</a:t>
+              <a:t>01.06.2016</a:t>
             </a:fld>
             <a:endParaRPr lang="de-DE"/>
           </a:p>
@@ -418,7 +418,7 @@
           <a:p>
             <a:fld id="{3FB6FB5E-3506-4600-8D76-9780A4BAAB5B}" type="datetimeFigureOut">
               <a:rPr lang="de-DE" smtClean="0"/>
-              <a:t>30.05.2016</a:t>
+              <a:t>01.06.2016</a:t>
             </a:fld>
             <a:endParaRPr lang="de-DE"/>
           </a:p>
@@ -596,7 +596,7 @@
           <a:p>
             <a:fld id="{3FB6FB5E-3506-4600-8D76-9780A4BAAB5B}" type="datetimeFigureOut">
               <a:rPr lang="de-DE" smtClean="0"/>
-              <a:t>30.05.2016</a:t>
+              <a:t>01.06.2016</a:t>
             </a:fld>
             <a:endParaRPr lang="de-DE"/>
           </a:p>
@@ -764,7 +764,7 @@
           <a:p>
             <a:fld id="{3FB6FB5E-3506-4600-8D76-9780A4BAAB5B}" type="datetimeFigureOut">
               <a:rPr lang="de-DE" smtClean="0"/>
-              <a:t>30.05.2016</a:t>
+              <a:t>01.06.2016</a:t>
             </a:fld>
             <a:endParaRPr lang="de-DE"/>
           </a:p>
@@ -1009,7 +1009,7 @@
           <a:p>
             <a:fld id="{3FB6FB5E-3506-4600-8D76-9780A4BAAB5B}" type="datetimeFigureOut">
               <a:rPr lang="de-DE" smtClean="0"/>
-              <a:t>30.05.2016</a:t>
+              <a:t>01.06.2016</a:t>
             </a:fld>
             <a:endParaRPr lang="de-DE"/>
           </a:p>
@@ -1238,7 +1238,7 @@
           <a:p>
             <a:fld id="{3FB6FB5E-3506-4600-8D76-9780A4BAAB5B}" type="datetimeFigureOut">
               <a:rPr lang="de-DE" smtClean="0"/>
-              <a:t>30.05.2016</a:t>
+              <a:t>01.06.2016</a:t>
             </a:fld>
             <a:endParaRPr lang="de-DE"/>
           </a:p>
@@ -1602,7 +1602,7 @@
           <a:p>
             <a:fld id="{3FB6FB5E-3506-4600-8D76-9780A4BAAB5B}" type="datetimeFigureOut">
               <a:rPr lang="de-DE" smtClean="0"/>
-              <a:t>30.05.2016</a:t>
+              <a:t>01.06.2016</a:t>
             </a:fld>
             <a:endParaRPr lang="de-DE"/>
           </a:p>
@@ -1719,7 +1719,7 @@
           <a:p>
             <a:fld id="{3FB6FB5E-3506-4600-8D76-9780A4BAAB5B}" type="datetimeFigureOut">
               <a:rPr lang="de-DE" smtClean="0"/>
-              <a:t>30.05.2016</a:t>
+              <a:t>01.06.2016</a:t>
             </a:fld>
             <a:endParaRPr lang="de-DE"/>
           </a:p>
@@ -1814,7 +1814,7 @@
           <a:p>
             <a:fld id="{3FB6FB5E-3506-4600-8D76-9780A4BAAB5B}" type="datetimeFigureOut">
               <a:rPr lang="de-DE" smtClean="0"/>
-              <a:t>30.05.2016</a:t>
+              <a:t>01.06.2016</a:t>
             </a:fld>
             <a:endParaRPr lang="de-DE"/>
           </a:p>
@@ -2089,7 +2089,7 @@
           <a:p>
             <a:fld id="{3FB6FB5E-3506-4600-8D76-9780A4BAAB5B}" type="datetimeFigureOut">
               <a:rPr lang="de-DE" smtClean="0"/>
-              <a:t>30.05.2016</a:t>
+              <a:t>01.06.2016</a:t>
             </a:fld>
             <a:endParaRPr lang="de-DE"/>
           </a:p>
@@ -2341,7 +2341,7 @@
           <a:p>
             <a:fld id="{3FB6FB5E-3506-4600-8D76-9780A4BAAB5B}" type="datetimeFigureOut">
               <a:rPr lang="de-DE" smtClean="0"/>
-              <a:t>30.05.2016</a:t>
+              <a:t>01.06.2016</a:t>
             </a:fld>
             <a:endParaRPr lang="de-DE"/>
           </a:p>
@@ -2552,7 +2552,7 @@
           <a:p>
             <a:fld id="{3FB6FB5E-3506-4600-8D76-9780A4BAAB5B}" type="datetimeFigureOut">
               <a:rPr lang="de-DE" smtClean="0"/>
-              <a:t>30.05.2016</a:t>
+              <a:t>01.06.2016</a:t>
             </a:fld>
             <a:endParaRPr lang="de-DE"/>
           </a:p>
@@ -5111,6 +5111,30 @@
           <a:chExt cx="0" cy="0"/>
         </a:xfrm>
       </p:grpSpPr>
+      <p:pic>
+        <p:nvPicPr>
+          <p:cNvPr id="2" name="Grafik 1"/>
+          <p:cNvPicPr>
+            <a:picLocks noChangeAspect="1"/>
+          </p:cNvPicPr>
+          <p:nvPr/>
+        </p:nvPicPr>
+        <p:blipFill>
+          <a:blip r:embed="rId2"/>
+          <a:stretch>
+            <a:fillRect/>
+          </a:stretch>
+        </p:blipFill>
+        <p:spPr>
+          <a:xfrm>
+            <a:off x="1357312" y="1912439"/>
+            <a:ext cx="9477375" cy="4391025"/>
+          </a:xfrm>
+          <a:prstGeom prst="rect">
+            <a:avLst/>
+          </a:prstGeom>
+        </p:spPr>
+      </p:pic>
       <p:sp>
         <p:nvSpPr>
           <p:cNvPr id="5" name="Abgerundetes Rechteck 4"/>
@@ -5246,22 +5270,28 @@
       </p:sp>
       <p:pic>
         <p:nvPicPr>
-          <p:cNvPr id="2" name="Grafik 1"/>
+          <p:cNvPr id="4" name="Grafik 3" descr="Bildschirmausschnitt"/>
           <p:cNvPicPr>
             <a:picLocks noChangeAspect="1"/>
           </p:cNvPicPr>
           <p:nvPr/>
         </p:nvPicPr>
         <p:blipFill>
-          <a:blip r:embed="rId2"/>
+          <a:blip r:embed="rId3">
+            <a:extLst>
+              <a:ext uri="{28A0092B-C50C-407E-A947-70E740481C1C}">
+                <a14:useLocalDpi xmlns:a14="http://schemas.microsoft.com/office/drawing/2010/main" val="0"/>
+              </a:ext>
+            </a:extLst>
+          </a:blip>
           <a:stretch>
             <a:fillRect/>
           </a:stretch>
         </p:blipFill>
         <p:spPr>
           <a:xfrm>
-            <a:off x="1357312" y="1912439"/>
-            <a:ext cx="9477375" cy="4391025"/>
+            <a:off x="1346391" y="1771698"/>
+            <a:ext cx="9516803" cy="4563112"/>
           </a:xfrm>
           <a:prstGeom prst="rect">
             <a:avLst/>

</xml_diff>